<commit_message>
go up changed, anti pinch added , intialization and de initialization added, manual mode edited
</commit_message>
<xml_diff>
--- a/Documents/20-020_W601.pptx
+++ b/Documents/20-020_W601.pptx
@@ -276,7 +276,7 @@
           <a:p>
             <a:fld id="{9DFF5471-3790-423B-9092-670F2B6ED9D0}" type="datetimeFigureOut">
               <a:rPr lang="en-IN" smtClean="0"/>
-              <a:t>23-12-2020</a:t>
+              <a:t>26-12-2020</a:t>
             </a:fld>
             <a:endParaRPr lang="en-IN"/>
           </a:p>
@@ -441,7 +441,7 @@
           <a:p>
             <a:fld id="{F1DD53B3-B155-4E53-B325-36994AC02032}" type="datetimeFigureOut">
               <a:rPr lang="en-IN" smtClean="0"/>
-              <a:t>23-12-2020</a:t>
+              <a:t>26-12-2020</a:t>
             </a:fld>
             <a:endParaRPr lang="en-IN"/>
           </a:p>
@@ -2664,7 +2664,7 @@
           <p:cNvPicPr>
             <a:picLocks noChangeAspect="1"/>
           </p:cNvPicPr>
-          <p:nvPr userDrawn="1"/>
+          <p:nvPr/>
         </p:nvPicPr>
         <p:blipFill>
           <a:blip r:embed="rId9"/>
@@ -2692,7 +2692,7 @@
             </a:extLst>
           </p:cNvPr>
           <p:cNvSpPr/>
-          <p:nvPr userDrawn="1"/>
+          <p:nvPr/>
         </p:nvSpPr>
         <p:spPr>
           <a:xfrm>
@@ -2737,7 +2737,7 @@
           <p:cNvPicPr>
             <a:picLocks noChangeAspect="1"/>
           </p:cNvPicPr>
-          <p:nvPr userDrawn="1"/>
+          <p:nvPr/>
         </p:nvPicPr>
         <p:blipFill>
           <a:blip r:embed="rId10"/>

</xml_diff>